<commit_message>
Modification de Contexte.md et My_personas.pptx Suppression de Contexte.txt
</commit_message>
<xml_diff>
--- a/doc/My_personas.pptx
+++ b/doc/My_personas.pptx
@@ -260,7 +260,7 @@
           <a:p>
             <a:fld id="{A7B0E074-460A-470E-9D20-D564A6D08896}" type="datetimeFigureOut">
               <a:rPr lang="fr-FR" smtClean="0"/>
-              <a:t>02/04/2020</a:t>
+              <a:t>03/04/2020</a:t>
             </a:fld>
             <a:endParaRPr lang="fr-FR"/>
           </a:p>
@@ -458,7 +458,7 @@
           <a:p>
             <a:fld id="{A7B0E074-460A-470E-9D20-D564A6D08896}" type="datetimeFigureOut">
               <a:rPr lang="fr-FR" smtClean="0"/>
-              <a:t>02/04/2020</a:t>
+              <a:t>03/04/2020</a:t>
             </a:fld>
             <a:endParaRPr lang="fr-FR"/>
           </a:p>
@@ -666,7 +666,7 @@
           <a:p>
             <a:fld id="{A7B0E074-460A-470E-9D20-D564A6D08896}" type="datetimeFigureOut">
               <a:rPr lang="fr-FR" smtClean="0"/>
-              <a:t>02/04/2020</a:t>
+              <a:t>03/04/2020</a:t>
             </a:fld>
             <a:endParaRPr lang="fr-FR"/>
           </a:p>
@@ -864,7 +864,7 @@
           <a:p>
             <a:fld id="{A7B0E074-460A-470E-9D20-D564A6D08896}" type="datetimeFigureOut">
               <a:rPr lang="fr-FR" smtClean="0"/>
-              <a:t>02/04/2020</a:t>
+              <a:t>03/04/2020</a:t>
             </a:fld>
             <a:endParaRPr lang="fr-FR"/>
           </a:p>
@@ -1139,7 +1139,7 @@
           <a:p>
             <a:fld id="{A7B0E074-460A-470E-9D20-D564A6D08896}" type="datetimeFigureOut">
               <a:rPr lang="fr-FR" smtClean="0"/>
-              <a:t>02/04/2020</a:t>
+              <a:t>03/04/2020</a:t>
             </a:fld>
             <a:endParaRPr lang="fr-FR"/>
           </a:p>
@@ -1404,7 +1404,7 @@
           <a:p>
             <a:fld id="{A7B0E074-460A-470E-9D20-D564A6D08896}" type="datetimeFigureOut">
               <a:rPr lang="fr-FR" smtClean="0"/>
-              <a:t>02/04/2020</a:t>
+              <a:t>03/04/2020</a:t>
             </a:fld>
             <a:endParaRPr lang="fr-FR"/>
           </a:p>
@@ -1816,7 +1816,7 @@
           <a:p>
             <a:fld id="{A7B0E074-460A-470E-9D20-D564A6D08896}" type="datetimeFigureOut">
               <a:rPr lang="fr-FR" smtClean="0"/>
-              <a:t>02/04/2020</a:t>
+              <a:t>03/04/2020</a:t>
             </a:fld>
             <a:endParaRPr lang="fr-FR"/>
           </a:p>
@@ -1957,7 +1957,7 @@
           <a:p>
             <a:fld id="{A7B0E074-460A-470E-9D20-D564A6D08896}" type="datetimeFigureOut">
               <a:rPr lang="fr-FR" smtClean="0"/>
-              <a:t>02/04/2020</a:t>
+              <a:t>03/04/2020</a:t>
             </a:fld>
             <a:endParaRPr lang="fr-FR"/>
           </a:p>
@@ -2070,7 +2070,7 @@
           <a:p>
             <a:fld id="{A7B0E074-460A-470E-9D20-D564A6D08896}" type="datetimeFigureOut">
               <a:rPr lang="fr-FR" smtClean="0"/>
-              <a:t>02/04/2020</a:t>
+              <a:t>03/04/2020</a:t>
             </a:fld>
             <a:endParaRPr lang="fr-FR"/>
           </a:p>
@@ -2381,7 +2381,7 @@
           <a:p>
             <a:fld id="{A7B0E074-460A-470E-9D20-D564A6D08896}" type="datetimeFigureOut">
               <a:rPr lang="fr-FR" smtClean="0"/>
-              <a:t>02/04/2020</a:t>
+              <a:t>03/04/2020</a:t>
             </a:fld>
             <a:endParaRPr lang="fr-FR"/>
           </a:p>
@@ -2669,7 +2669,7 @@
           <a:p>
             <a:fld id="{A7B0E074-460A-470E-9D20-D564A6D08896}" type="datetimeFigureOut">
               <a:rPr lang="fr-FR" smtClean="0"/>
-              <a:t>02/04/2020</a:t>
+              <a:t>03/04/2020</a:t>
             </a:fld>
             <a:endParaRPr lang="fr-FR"/>
           </a:p>
@@ -2910,7 +2910,7 @@
           <a:p>
             <a:fld id="{A7B0E074-460A-470E-9D20-D564A6D08896}" type="datetimeFigureOut">
               <a:rPr lang="fr-FR" smtClean="0"/>
-              <a:t>02/04/2020</a:t>
+              <a:t>03/04/2020</a:t>
             </a:fld>
             <a:endParaRPr lang="fr-FR"/>
           </a:p>
@@ -3329,53 +3329,6 @@
       </p:grpSpPr>
       <p:sp>
         <p:nvSpPr>
-          <p:cNvPr id="4" name="Rectangle 3">
-            <a:extLst>
-              <a:ext uri="{FF2B5EF4-FFF2-40B4-BE49-F238E27FC236}">
-                <a16:creationId xmlns:a16="http://schemas.microsoft.com/office/drawing/2014/main" id="{40FD6CC0-7DFB-4D25-B7BE-1196BBE937F8}"/>
-              </a:ext>
-            </a:extLst>
-          </p:cNvPr>
-          <p:cNvSpPr/>
-          <p:nvPr/>
-        </p:nvSpPr>
-        <p:spPr>
-          <a:xfrm>
-            <a:off x="233917" y="502540"/>
-            <a:ext cx="1520456" cy="1658679"/>
-          </a:xfrm>
-          <a:prstGeom prst="rect">
-            <a:avLst/>
-          </a:prstGeom>
-          <a:noFill/>
-        </p:spPr>
-        <p:style>
-          <a:lnRef idx="2">
-            <a:schemeClr val="accent1">
-              <a:shade val="50000"/>
-            </a:schemeClr>
-          </a:lnRef>
-          <a:fillRef idx="1">
-            <a:schemeClr val="accent1"/>
-          </a:fillRef>
-          <a:effectRef idx="0">
-            <a:schemeClr val="accent1"/>
-          </a:effectRef>
-          <a:fontRef idx="minor">
-            <a:schemeClr val="lt1"/>
-          </a:fontRef>
-        </p:style>
-        <p:txBody>
-          <a:bodyPr rtlCol="0" anchor="ctr"/>
-          <a:lstStyle/>
-          <a:p>
-            <a:pPr algn="ctr"/>
-            <a:endParaRPr lang="fr-FR" dirty="0"/>
-          </a:p>
-        </p:txBody>
-      </p:sp>
-      <p:sp>
-        <p:nvSpPr>
           <p:cNvPr id="5" name="ZoneTexte 4">
             <a:extLst>
               <a:ext uri="{FF2B5EF4-FFF2-40B4-BE49-F238E27FC236}">
@@ -3824,6 +3777,42 @@
           </a:p>
         </p:txBody>
       </p:sp>
+      <p:pic>
+        <p:nvPicPr>
+          <p:cNvPr id="3" name="Image 2" descr="Une image contenant personne, intérieur, cravate, souriant&#10;&#10;Description générée automatiquement">
+            <a:extLst>
+              <a:ext uri="{FF2B5EF4-FFF2-40B4-BE49-F238E27FC236}">
+                <a16:creationId xmlns:a16="http://schemas.microsoft.com/office/drawing/2014/main" id="{177F29F1-E562-4EDA-8F9C-76EDD6911404}"/>
+              </a:ext>
+            </a:extLst>
+          </p:cNvPr>
+          <p:cNvPicPr>
+            <a:picLocks noChangeAspect="1"/>
+          </p:cNvPicPr>
+          <p:nvPr/>
+        </p:nvPicPr>
+        <p:blipFill>
+          <a:blip r:embed="rId2">
+            <a:extLst>
+              <a:ext uri="{28A0092B-C50C-407E-A947-70E740481C1C}">
+                <a14:useLocalDpi xmlns:a14="http://schemas.microsoft.com/office/drawing/2010/main" val="0"/>
+              </a:ext>
+            </a:extLst>
+          </a:blip>
+          <a:stretch>
+            <a:fillRect/>
+          </a:stretch>
+        </p:blipFill>
+        <p:spPr>
+          <a:xfrm>
+            <a:off x="265815" y="562375"/>
+            <a:ext cx="1668057" cy="1668057"/>
+          </a:xfrm>
+          <a:prstGeom prst="rect">
+            <a:avLst/>
+          </a:prstGeom>
+        </p:spPr>
+      </p:pic>
     </p:spTree>
     <p:extLst>
       <p:ext uri="{BB962C8B-B14F-4D97-AF65-F5344CB8AC3E}">
@@ -3898,53 +3887,6 @@
       </p:sp>
       <p:sp>
         <p:nvSpPr>
-          <p:cNvPr id="5" name="Rectangle 4">
-            <a:extLst>
-              <a:ext uri="{FF2B5EF4-FFF2-40B4-BE49-F238E27FC236}">
-                <a16:creationId xmlns:a16="http://schemas.microsoft.com/office/drawing/2014/main" id="{5BF0F102-434D-42F6-AEB3-EEF4F817CEC1}"/>
-              </a:ext>
-            </a:extLst>
-          </p:cNvPr>
-          <p:cNvSpPr/>
-          <p:nvPr/>
-        </p:nvSpPr>
-        <p:spPr>
-          <a:xfrm>
-            <a:off x="233917" y="502540"/>
-            <a:ext cx="1520456" cy="1658679"/>
-          </a:xfrm>
-          <a:prstGeom prst="rect">
-            <a:avLst/>
-          </a:prstGeom>
-          <a:noFill/>
-        </p:spPr>
-        <p:style>
-          <a:lnRef idx="2">
-            <a:schemeClr val="accent1">
-              <a:shade val="50000"/>
-            </a:schemeClr>
-          </a:lnRef>
-          <a:fillRef idx="1">
-            <a:schemeClr val="accent1"/>
-          </a:fillRef>
-          <a:effectRef idx="0">
-            <a:schemeClr val="accent1"/>
-          </a:effectRef>
-          <a:fontRef idx="minor">
-            <a:schemeClr val="lt1"/>
-          </a:fontRef>
-        </p:style>
-        <p:txBody>
-          <a:bodyPr rtlCol="0" anchor="ctr"/>
-          <a:lstStyle/>
-          <a:p>
-            <a:pPr algn="ctr"/>
-            <a:endParaRPr lang="fr-FR" dirty="0"/>
-          </a:p>
-        </p:txBody>
-      </p:sp>
-      <p:sp>
-        <p:nvSpPr>
           <p:cNvPr id="6" name="ZoneTexte 5">
             <a:extLst>
               <a:ext uri="{FF2B5EF4-FFF2-40B4-BE49-F238E27FC236}">
@@ -4333,6 +4275,42 @@
           </a:p>
         </p:txBody>
       </p:sp>
+      <p:pic>
+        <p:nvPicPr>
+          <p:cNvPr id="3" name="Image 2" descr="Une image contenant personne, bâtiment, extérieur, souriant&#10;&#10;Description générée automatiquement">
+            <a:extLst>
+              <a:ext uri="{FF2B5EF4-FFF2-40B4-BE49-F238E27FC236}">
+                <a16:creationId xmlns:a16="http://schemas.microsoft.com/office/drawing/2014/main" id="{1F214E60-DEA3-4027-97DA-E4F3BC4D16F3}"/>
+              </a:ext>
+            </a:extLst>
+          </p:cNvPr>
+          <p:cNvPicPr>
+            <a:picLocks noChangeAspect="1"/>
+          </p:cNvPicPr>
+          <p:nvPr/>
+        </p:nvPicPr>
+        <p:blipFill>
+          <a:blip r:embed="rId2">
+            <a:extLst>
+              <a:ext uri="{28A0092B-C50C-407E-A947-70E740481C1C}">
+                <a14:useLocalDpi xmlns:a14="http://schemas.microsoft.com/office/drawing/2010/main" val="0"/>
+              </a:ext>
+            </a:extLst>
+          </a:blip>
+          <a:stretch>
+            <a:fillRect/>
+          </a:stretch>
+        </p:blipFill>
+        <p:spPr>
+          <a:xfrm>
+            <a:off x="233917" y="595423"/>
+            <a:ext cx="1734879" cy="1734879"/>
+          </a:xfrm>
+          <a:prstGeom prst="rect">
+            <a:avLst/>
+          </a:prstGeom>
+        </p:spPr>
+      </p:pic>
     </p:spTree>
     <p:extLst>
       <p:ext uri="{BB962C8B-B14F-4D97-AF65-F5344CB8AC3E}">

</xml_diff>